<commit_message>
feat(plans/reports): add axe slides & fa slides
</commit_message>
<xml_diff>
--- a/apps/backend/src/plans/plans/generate-reports/docs/template_bilan.pptx
+++ b/apps/backend/src/plans/plans/generate-reports/docs/template_bilan.pptx
@@ -20,8 +20,8 @@
     <p:sldId id="266" r:id="rId11"/>
     <p:sldId id="267" r:id="rId12"/>
     <p:sldId id="268" r:id="rId13"/>
-    <p:sldId id="269" r:id="rId14"/>
-    <p:sldId id="270" r:id="rId15"/>
+    <p:sldId id="270" r:id="rId14"/>
+    <p:sldId id="269" r:id="rId15"/>
     <p:sldId id="271" r:id="rId16"/>
     <p:sldId id="272" r:id="rId17"/>
     <p:sldId id="273" r:id="rId18"/>
@@ -1169,6 +1169,110 @@
   <p:cSld>
     <p:spTree>
       <p:nvGrpSpPr>
+        <p:cNvPr id="1" name="Shape 289"/>
+        <p:cNvGrpSpPr/>
+        <p:nvPr/>
+      </p:nvGrpSpPr>
+      <p:grpSpPr>
+        <a:xfrm>
+          <a:off x="0" y="0"/>
+          <a:ext cx="0" cy="0"/>
+          <a:chOff x="0" y="0"/>
+          <a:chExt cx="0" cy="0"/>
+        </a:xfrm>
+      </p:grpSpPr>
+      <p:sp>
+        <p:nvSpPr>
+          <p:cNvPr id="290" name="Google Shape;290;g39fdd9055c2_1_75:notes"/>
+          <p:cNvSpPr>
+            <a:spLocks noGrp="1" noRot="1" noChangeAspect="1"/>
+          </p:cNvSpPr>
+          <p:nvPr>
+            <p:ph type="sldImg" idx="2"/>
+          </p:nvPr>
+        </p:nvSpPr>
+        <p:spPr>
+          <a:xfrm>
+            <a:off x="381000" y="685800"/>
+            <a:ext cx="6096000" cy="3429000"/>
+          </a:xfrm>
+          <a:custGeom>
+            <a:avLst/>
+            <a:gdLst/>
+            <a:ahLst/>
+            <a:cxnLst/>
+            <a:rect l="l" t="t" r="r" b="b"/>
+            <a:pathLst>
+              <a:path w="120000" h="120000" extrusionOk="0">
+                <a:moveTo>
+                  <a:pt x="0" y="0"/>
+                </a:moveTo>
+                <a:lnTo>
+                  <a:pt x="120000" y="0"/>
+                </a:lnTo>
+                <a:lnTo>
+                  <a:pt x="120000" y="120000"/>
+                </a:lnTo>
+                <a:lnTo>
+                  <a:pt x="0" y="120000"/>
+                </a:lnTo>
+                <a:close/>
+              </a:path>
+            </a:pathLst>
+          </a:custGeom>
+        </p:spPr>
+      </p:sp>
+      <p:sp>
+        <p:nvSpPr>
+          <p:cNvPr id="291" name="Google Shape;291;g39fdd9055c2_1_75:notes"/>
+          <p:cNvSpPr txBox="1">
+            <a:spLocks noGrp="1"/>
+          </p:cNvSpPr>
+          <p:nvPr>
+            <p:ph type="body" idx="1"/>
+          </p:nvPr>
+        </p:nvSpPr>
+        <p:spPr>
+          <a:xfrm>
+            <a:off x="685800" y="4343400"/>
+            <a:ext cx="5486400" cy="4114800"/>
+          </a:xfrm>
+          <a:prstGeom prst="rect">
+            <a:avLst/>
+          </a:prstGeom>
+        </p:spPr>
+        <p:txBody>
+          <a:bodyPr spcFirstLastPara="1" wrap="square" lIns="91425" tIns="91425" rIns="91425" bIns="91425" anchor="t" anchorCtr="0">
+            <a:noAutofit/>
+          </a:bodyPr>
+          <a:lstStyle/>
+          <a:p>
+            <a:pPr marL="0" lvl="0" indent="0" algn="l" rtl="0">
+              <a:spcBef>
+                <a:spcPts val="0"/>
+              </a:spcBef>
+              <a:spcAft>
+                <a:spcPts val="0"/>
+              </a:spcAft>
+              <a:buNone/>
+            </a:pPr>
+            <a:endParaRPr/>
+          </a:p>
+        </p:txBody>
+      </p:sp>
+    </p:spTree>
+  </p:cSld>
+  <p:clrMapOvr>
+    <a:masterClrMapping/>
+  </p:clrMapOvr>
+</p:notes>
+</file>
+
+<file path=ppt/notesSlides/notesSlide14.xml><?xml version="1.0" encoding="utf-8"?>
+<p:notes xmlns:a="http://schemas.openxmlformats.org/drawingml/2006/main" xmlns:r="http://schemas.openxmlformats.org/officeDocument/2006/relationships" xmlns:p="http://schemas.openxmlformats.org/presentationml/2006/main" showMasterSp="0" showMasterPhAnim="0">
+  <p:cSld>
+    <p:spTree>
+      <p:nvGrpSpPr>
         <p:cNvPr id="1" name="Shape 265"/>
         <p:cNvGrpSpPr/>
         <p:nvPr/>
@@ -1225,110 +1329,6 @@
       <p:sp>
         <p:nvSpPr>
           <p:cNvPr id="267" name="Google Shape;267;g3a7733054ba_0_129:notes"/>
-          <p:cNvSpPr txBox="1">
-            <a:spLocks noGrp="1"/>
-          </p:cNvSpPr>
-          <p:nvPr>
-            <p:ph type="body" idx="1"/>
-          </p:nvPr>
-        </p:nvSpPr>
-        <p:spPr>
-          <a:xfrm>
-            <a:off x="685800" y="4343400"/>
-            <a:ext cx="5486400" cy="4114800"/>
-          </a:xfrm>
-          <a:prstGeom prst="rect">
-            <a:avLst/>
-          </a:prstGeom>
-        </p:spPr>
-        <p:txBody>
-          <a:bodyPr spcFirstLastPara="1" wrap="square" lIns="91425" tIns="91425" rIns="91425" bIns="91425" anchor="t" anchorCtr="0">
-            <a:noAutofit/>
-          </a:bodyPr>
-          <a:lstStyle/>
-          <a:p>
-            <a:pPr marL="0" lvl="0" indent="0" algn="l" rtl="0">
-              <a:spcBef>
-                <a:spcPts val="0"/>
-              </a:spcBef>
-              <a:spcAft>
-                <a:spcPts val="0"/>
-              </a:spcAft>
-              <a:buNone/>
-            </a:pPr>
-            <a:endParaRPr/>
-          </a:p>
-        </p:txBody>
-      </p:sp>
-    </p:spTree>
-  </p:cSld>
-  <p:clrMapOvr>
-    <a:masterClrMapping/>
-  </p:clrMapOvr>
-</p:notes>
-</file>
-
-<file path=ppt/notesSlides/notesSlide14.xml><?xml version="1.0" encoding="utf-8"?>
-<p:notes xmlns:a="http://schemas.openxmlformats.org/drawingml/2006/main" xmlns:r="http://schemas.openxmlformats.org/officeDocument/2006/relationships" xmlns:p="http://schemas.openxmlformats.org/presentationml/2006/main" showMasterSp="0" showMasterPhAnim="0">
-  <p:cSld>
-    <p:spTree>
-      <p:nvGrpSpPr>
-        <p:cNvPr id="1" name="Shape 289"/>
-        <p:cNvGrpSpPr/>
-        <p:nvPr/>
-      </p:nvGrpSpPr>
-      <p:grpSpPr>
-        <a:xfrm>
-          <a:off x="0" y="0"/>
-          <a:ext cx="0" cy="0"/>
-          <a:chOff x="0" y="0"/>
-          <a:chExt cx="0" cy="0"/>
-        </a:xfrm>
-      </p:grpSpPr>
-      <p:sp>
-        <p:nvSpPr>
-          <p:cNvPr id="290" name="Google Shape;290;g39fdd9055c2_1_75:notes"/>
-          <p:cNvSpPr>
-            <a:spLocks noGrp="1" noRot="1" noChangeAspect="1"/>
-          </p:cNvSpPr>
-          <p:nvPr>
-            <p:ph type="sldImg" idx="2"/>
-          </p:nvPr>
-        </p:nvSpPr>
-        <p:spPr>
-          <a:xfrm>
-            <a:off x="381000" y="685800"/>
-            <a:ext cx="6096000" cy="3429000"/>
-          </a:xfrm>
-          <a:custGeom>
-            <a:avLst/>
-            <a:gdLst/>
-            <a:ahLst/>
-            <a:cxnLst/>
-            <a:rect l="l" t="t" r="r" b="b"/>
-            <a:pathLst>
-              <a:path w="120000" h="120000" extrusionOk="0">
-                <a:moveTo>
-                  <a:pt x="0" y="0"/>
-                </a:moveTo>
-                <a:lnTo>
-                  <a:pt x="120000" y="0"/>
-                </a:lnTo>
-                <a:lnTo>
-                  <a:pt x="120000" y="120000"/>
-                </a:lnTo>
-                <a:lnTo>
-                  <a:pt x="0" y="120000"/>
-                </a:lnTo>
-                <a:close/>
-              </a:path>
-            </a:pathLst>
-          </a:custGeom>
-        </p:spPr>
-      </p:sp>
-      <p:sp>
-        <p:nvSpPr>
-          <p:cNvPr id="291" name="Google Shape;291;g39fdd9055c2_1_75:notes"/>
           <p:cNvSpPr txBox="1">
             <a:spLocks noGrp="1"/>
           </p:cNvSpPr>
@@ -12200,6 +12200,306 @@
   <p:cSld>
     <p:spTree>
       <p:nvGrpSpPr>
+        <p:cNvPr id="1" name="Shape 292"/>
+        <p:cNvGrpSpPr/>
+        <p:nvPr/>
+      </p:nvGrpSpPr>
+      <p:grpSpPr>
+        <a:xfrm>
+          <a:off x="0" y="0"/>
+          <a:ext cx="0" cy="0"/>
+          <a:chOff x="0" y="0"/>
+          <a:chExt cx="0" cy="0"/>
+        </a:xfrm>
+      </p:grpSpPr>
+      <p:sp>
+        <p:nvSpPr>
+          <p:cNvPr id="293" name="Google Shape;293;p31"/>
+          <p:cNvSpPr txBox="1">
+            <a:spLocks noGrp="1"/>
+          </p:cNvSpPr>
+          <p:nvPr>
+            <p:ph type="title"/>
+          </p:nvPr>
+        </p:nvSpPr>
+        <p:spPr>
+          <a:xfrm>
+            <a:off x="576300" y="2754350"/>
+            <a:ext cx="7991400" cy="524100"/>
+          </a:xfrm>
+          <a:prstGeom prst="rect">
+            <a:avLst/>
+          </a:prstGeom>
+        </p:spPr>
+        <p:txBody>
+          <a:bodyPr spcFirstLastPara="1" wrap="square" lIns="91425" tIns="91425" rIns="91425" bIns="91425" anchor="t" anchorCtr="0">
+            <a:normAutofit/>
+          </a:bodyPr>
+          <a:lstStyle/>
+          <a:p>
+            <a:pPr marL="0" lvl="0" indent="0" algn="ctr" rtl="0">
+              <a:spcBef>
+                <a:spcPts val="0"/>
+              </a:spcBef>
+              <a:spcAft>
+                <a:spcPts val="0"/>
+              </a:spcAft>
+              <a:buNone/>
+            </a:pPr>
+            <a:r>
+              <a:rPr lang="fr"/>
+              <a:t>Avancement des axes et leur actions</a:t>
+            </a:r>
+            <a:endParaRPr/>
+          </a:p>
+        </p:txBody>
+      </p:sp>
+      <p:sp>
+        <p:nvSpPr>
+          <p:cNvPr id="294" name="Google Shape;294;p31"/>
+          <p:cNvSpPr txBox="1">
+            <a:spLocks noGrp="1"/>
+          </p:cNvSpPr>
+          <p:nvPr>
+            <p:ph type="sldNum" idx="12"/>
+          </p:nvPr>
+        </p:nvSpPr>
+        <p:spPr>
+          <a:xfrm>
+            <a:off x="8567700" y="4820999"/>
+            <a:ext cx="548700" cy="322500"/>
+          </a:xfrm>
+          <a:prstGeom prst="rect">
+            <a:avLst/>
+          </a:prstGeom>
+        </p:spPr>
+        <p:txBody>
+          <a:bodyPr spcFirstLastPara="1" wrap="square" lIns="91425" tIns="91425" rIns="91425" bIns="91425" anchor="ctr" anchorCtr="0">
+            <a:normAutofit lnSpcReduction="10000"/>
+          </a:bodyPr>
+          <a:lstStyle/>
+          <a:p>
+            <a:pPr marL="0" lvl="0" indent="0" algn="r" rtl="0">
+              <a:spcBef>
+                <a:spcPts val="0"/>
+              </a:spcBef>
+              <a:spcAft>
+                <a:spcPts val="0"/>
+              </a:spcAft>
+              <a:buNone/>
+            </a:pPr>
+            <a:fld id="{00000000-1234-1234-1234-123412341234}" type="slidenum">
+              <a:rPr lang="fr"/>
+              <a:t>13</a:t>
+            </a:fld>
+            <a:endParaRPr/>
+          </a:p>
+        </p:txBody>
+      </p:sp>
+      <p:pic>
+        <p:nvPicPr>
+          <p:cNvPr id="295" name="Google Shape;295;p31" title="Trajectoire.png"/>
+          <p:cNvPicPr preferRelativeResize="0"/>
+          <p:nvPr/>
+        </p:nvPicPr>
+        <p:blipFill>
+          <a:blip r:embed="rId3">
+            <a:alphaModFix/>
+          </a:blip>
+          <a:stretch>
+            <a:fillRect/>
+          </a:stretch>
+        </p:blipFill>
+        <p:spPr>
+          <a:xfrm>
+            <a:off x="4095003" y="1641276"/>
+            <a:ext cx="954000" cy="954000"/>
+          </a:xfrm>
+          <a:prstGeom prst="rect">
+            <a:avLst/>
+          </a:prstGeom>
+          <a:noFill/>
+          <a:ln>
+            <a:noFill/>
+          </a:ln>
+        </p:spPr>
+      </p:pic>
+      <p:sp>
+        <p:nvSpPr>
+          <p:cNvPr id="296" name="Google Shape;296;p31"/>
+          <p:cNvSpPr txBox="1"/>
+          <p:nvPr/>
+        </p:nvSpPr>
+        <p:spPr>
+          <a:xfrm>
+            <a:off x="1265200" y="183775"/>
+            <a:ext cx="3932700" cy="215400"/>
+          </a:xfrm>
+          <a:prstGeom prst="rect">
+            <a:avLst/>
+          </a:prstGeom>
+          <a:noFill/>
+          <a:ln>
+            <a:noFill/>
+          </a:ln>
+        </p:spPr>
+        <p:txBody>
+          <a:bodyPr spcFirstLastPara="1" wrap="square" lIns="0" tIns="0" rIns="0" bIns="0" anchor="ctr" anchorCtr="0">
+            <a:spAutoFit/>
+          </a:bodyPr>
+          <a:lstStyle/>
+          <a:p>
+            <a:pPr marL="0" lvl="0" indent="0" algn="l" rtl="0">
+              <a:spcBef>
+                <a:spcPts val="0"/>
+              </a:spcBef>
+              <a:spcAft>
+                <a:spcPts val="0"/>
+              </a:spcAft>
+              <a:buNone/>
+            </a:pPr>
+            <a:r>
+              <a:rPr lang="fr" dirty="0">
+                <a:solidFill>
+                  <a:schemeClr val="dk1"/>
+                </a:solidFill>
+                <a:latin typeface="Poppins SemiBold"/>
+                <a:ea typeface="Poppins SemiBold"/>
+                <a:cs typeface="Poppins SemiBold"/>
+                <a:sym typeface="Poppins SemiBold"/>
+              </a:rPr>
+              <a:t>{{PLAN_NOM}}</a:t>
+            </a:r>
+            <a:endParaRPr dirty="0">
+              <a:solidFill>
+                <a:schemeClr val="dk1"/>
+              </a:solidFill>
+              <a:latin typeface="Poppins SemiBold"/>
+              <a:ea typeface="Poppins SemiBold"/>
+              <a:cs typeface="Poppins SemiBold"/>
+              <a:sym typeface="Poppins SemiBold"/>
+            </a:endParaRPr>
+          </a:p>
+        </p:txBody>
+      </p:sp>
+      <p:sp>
+        <p:nvSpPr>
+          <p:cNvPr id="297" name="Google Shape;297;p31"/>
+          <p:cNvSpPr txBox="1"/>
+          <p:nvPr/>
+        </p:nvSpPr>
+        <p:spPr>
+          <a:xfrm>
+            <a:off x="1265200" y="399175"/>
+            <a:ext cx="7115700" cy="138600"/>
+          </a:xfrm>
+          <a:prstGeom prst="rect">
+            <a:avLst/>
+          </a:prstGeom>
+          <a:noFill/>
+          <a:ln>
+            <a:noFill/>
+          </a:ln>
+        </p:spPr>
+        <p:txBody>
+          <a:bodyPr spcFirstLastPara="1" wrap="square" lIns="0" tIns="0" rIns="0" bIns="0" anchor="ctr" anchorCtr="0">
+            <a:noAutofit/>
+          </a:bodyPr>
+          <a:lstStyle/>
+          <a:p>
+            <a:pPr marL="0" lvl="0" indent="0" algn="l" rtl="0">
+              <a:spcBef>
+                <a:spcPts val="0"/>
+              </a:spcBef>
+              <a:spcAft>
+                <a:spcPts val="0"/>
+              </a:spcAft>
+              <a:buNone/>
+            </a:pPr>
+            <a:r>
+              <a:rPr lang="fr-FR" sz="900" dirty="0">
+                <a:solidFill>
+                  <a:srgbClr val="999999"/>
+                </a:solidFill>
+                <a:latin typeface="Poppins Medium"/>
+                <a:ea typeface="Poppins Medium"/>
+                <a:cs typeface="Poppins Medium"/>
+                <a:sym typeface="Poppins Medium"/>
+              </a:rPr>
+              <a:t>{{PLAN_TYPE}}</a:t>
+            </a:r>
+            <a:endParaRPr sz="900" dirty="0">
+              <a:solidFill>
+                <a:srgbClr val="999999"/>
+              </a:solidFill>
+              <a:latin typeface="Poppins Medium"/>
+              <a:ea typeface="Poppins Medium"/>
+              <a:cs typeface="Poppins Medium"/>
+              <a:sym typeface="Poppins Medium"/>
+            </a:endParaRPr>
+          </a:p>
+        </p:txBody>
+      </p:sp>
+      <p:pic>
+        <p:nvPicPr>
+          <p:cNvPr id="2" name="img_collectivite_logo">
+            <a:extLst>
+              <a:ext uri="{FF2B5EF4-FFF2-40B4-BE49-F238E27FC236}">
+                <a16:creationId xmlns:a16="http://schemas.microsoft.com/office/drawing/2014/main" id="{E0659167-A37A-755E-0041-CA9015CA0778}"/>
+              </a:ext>
+            </a:extLst>
+          </p:cNvPr>
+          <p:cNvPicPr>
+            <a:picLocks noChangeAspect="1" noChangeArrowheads="1"/>
+          </p:cNvPicPr>
+          <p:nvPr/>
+        </p:nvPicPr>
+        <p:blipFill>
+          <a:blip r:embed="rId4">
+            <a:extLst>
+              <a:ext uri="{28A0092B-C50C-407E-A947-70E740481C1C}">
+                <a14:useLocalDpi xmlns:a14="http://schemas.microsoft.com/office/drawing/2010/main" val="0"/>
+              </a:ext>
+            </a:extLst>
+          </a:blip>
+          <a:srcRect/>
+          <a:stretch>
+            <a:fillRect/>
+          </a:stretch>
+        </p:blipFill>
+        <p:spPr bwMode="auto">
+          <a:xfrm>
+            <a:off x="254236" y="265816"/>
+            <a:ext cx="923528" cy="254669"/>
+          </a:xfrm>
+          <a:prstGeom prst="rect">
+            <a:avLst/>
+          </a:prstGeom>
+          <a:noFill/>
+          <a:extLst>
+            <a:ext uri="{909E8E84-426E-40DD-AFC4-6F175D3DCCD1}">
+              <a14:hiddenFill xmlns:a14="http://schemas.microsoft.com/office/drawing/2010/main">
+                <a:solidFill>
+                  <a:srgbClr val="FFFFFF"/>
+                </a:solidFill>
+              </a14:hiddenFill>
+            </a:ext>
+          </a:extLst>
+        </p:spPr>
+      </p:pic>
+    </p:spTree>
+  </p:cSld>
+  <p:clrMapOvr>
+    <a:masterClrMapping/>
+  </p:clrMapOvr>
+</p:sld>
+</file>
+
+<file path=ppt/slides/slide14.xml><?xml version="1.0" encoding="utf-8"?>
+<p:sld xmlns:a="http://schemas.openxmlformats.org/drawingml/2006/main" xmlns:r="http://schemas.openxmlformats.org/officeDocument/2006/relationships" xmlns:p="http://schemas.openxmlformats.org/presentationml/2006/main">
+  <p:cSld>
+    <p:spTree>
+      <p:nvGrpSpPr>
         <p:cNvPr id="1" name="Shape 268"/>
         <p:cNvGrpSpPr/>
         <p:nvPr/>
@@ -12247,10 +12547,10 @@
               <a:buNone/>
             </a:pPr>
             <a:r>
-              <a:rPr lang="fr" sz="1600"/>
-              <a:t>Axe 1. Déchets et Économie Circulaire</a:t>
+              <a:rPr lang="fr" sz="1600" dirty="0"/>
+              <a:t> {{AXE_NOM}} </a:t>
             </a:r>
-            <a:endParaRPr sz="1600"/>
+            <a:endParaRPr sz="1600" dirty="0"/>
           </a:p>
         </p:txBody>
       </p:sp>
@@ -12290,7 +12590,7 @@
             </a:pPr>
             <a:fld id="{00000000-1234-1234-1234-123412341234}" type="slidenum">
               <a:rPr lang="fr"/>
-              <a:t>13</a:t>
+              <a:t>14</a:t>
             </a:fld>
             <a:endParaRPr/>
           </a:p>
@@ -12358,7 +12658,7 @@
         <p:spPr>
           <a:xfrm>
             <a:off x="3684848" y="2352840"/>
-            <a:ext cx="1738200" cy="155700"/>
+            <a:ext cx="1738200" cy="295594"/>
           </a:xfrm>
           <a:prstGeom prst="rect">
             <a:avLst/>
@@ -12389,7 +12689,7 @@
               <a:buNone/>
             </a:pPr>
             <a:r>
-              <a:rPr lang="fr" sz="910" b="1">
+              <a:rPr lang="fr" sz="910" b="1" dirty="0">
                 <a:solidFill>
                   <a:schemeClr val="dk1"/>
                 </a:solidFill>
@@ -12401,7 +12701,7 @@
               <a:t>Avancement : </a:t>
             </a:r>
             <a:r>
-              <a:rPr lang="fr" sz="1011">
+              <a:rPr lang="fr" sz="1011" dirty="0">
                 <a:solidFill>
                   <a:schemeClr val="accent3"/>
                 </a:solidFill>
@@ -12410,9 +12710,9 @@
                 <a:cs typeface="Poppins ExtraBold"/>
                 <a:sym typeface="Poppins ExtraBold"/>
               </a:rPr>
-              <a:t>33 %</a:t>
+              <a:t>{{AXE_PROGRESS}} %</a:t>
             </a:r>
-            <a:endParaRPr sz="1214">
+            <a:endParaRPr sz="1214" dirty="0">
               <a:solidFill>
                 <a:srgbClr val="48A775"/>
               </a:solidFill>
@@ -12849,7 +13149,7 @@
         <p:spPr>
           <a:xfrm>
             <a:off x="6196398" y="2200718"/>
-            <a:ext cx="2600700" cy="638700"/>
+            <a:ext cx="2600700" cy="1260217"/>
           </a:xfrm>
           <a:prstGeom prst="rect">
             <a:avLst/>
@@ -12880,7 +13180,7 @@
               <a:buNone/>
             </a:pPr>
             <a:r>
-              <a:rPr lang="fr" sz="910" b="1">
+              <a:rPr lang="fr" sz="910" b="1" dirty="0">
                 <a:solidFill>
                   <a:schemeClr val="dk1"/>
                 </a:solidFill>
@@ -12891,7 +13191,7 @@
               </a:rPr>
               <a:t>Structure de l'axe:</a:t>
             </a:r>
-            <a:endParaRPr sz="910" b="1">
+            <a:endParaRPr sz="910" b="1" dirty="0">
               <a:solidFill>
                 <a:schemeClr val="dk1"/>
               </a:solidFill>
@@ -12917,7 +13217,7 @@
               <a:buNone/>
             </a:pPr>
             <a:r>
-              <a:rPr lang="fr" sz="1011">
+              <a:rPr lang="fr" sz="1011" dirty="0">
                 <a:solidFill>
                   <a:schemeClr val="accent3"/>
                 </a:solidFill>
@@ -12926,10 +13226,10 @@
                 <a:cs typeface="Poppins ExtraBold"/>
                 <a:sym typeface="Poppins ExtraBold"/>
               </a:rPr>
-              <a:t>11</a:t>
+              <a:t>{{SOUS_AXES_COUNT}}</a:t>
             </a:r>
             <a:r>
-              <a:rPr lang="fr" sz="1011">
+              <a:rPr lang="fr" sz="1011" dirty="0">
                 <a:solidFill>
                   <a:srgbClr val="48A775"/>
                 </a:solidFill>
@@ -12941,7 +13241,7 @@
               <a:t> </a:t>
             </a:r>
             <a:r>
-              <a:rPr lang="fr" sz="1011">
+              <a:rPr lang="fr" sz="1011" dirty="0">
                 <a:solidFill>
                   <a:schemeClr val="accent2"/>
                 </a:solidFill>
@@ -12953,7 +13253,7 @@
               <a:t>sous-axes </a:t>
             </a:r>
             <a:r>
-              <a:rPr lang="fr" sz="1011">
+              <a:rPr lang="fr" sz="1011" dirty="0">
                 <a:solidFill>
                   <a:schemeClr val="accent3"/>
                 </a:solidFill>
@@ -12962,10 +13262,10 @@
                 <a:cs typeface="Poppins ExtraBold"/>
                 <a:sym typeface="Poppins ExtraBold"/>
               </a:rPr>
-              <a:t>23</a:t>
+              <a:t>{{INDICATEURS_COUNT}}</a:t>
             </a:r>
             <a:r>
-              <a:rPr lang="fr" sz="1011">
+              <a:rPr lang="fr" sz="1011" dirty="0">
                 <a:solidFill>
                   <a:schemeClr val="dk1"/>
                 </a:solidFill>
@@ -12976,7 +13276,7 @@
               </a:rPr>
               <a:t> indicateurs de suivi</a:t>
             </a:r>
-            <a:endParaRPr sz="1011">
+            <a:endParaRPr sz="1011" dirty="0">
               <a:solidFill>
                 <a:schemeClr val="dk1"/>
               </a:solidFill>
@@ -13002,7 +13302,7 @@
               <a:buNone/>
             </a:pPr>
             <a:r>
-              <a:rPr lang="fr" sz="1011">
+              <a:rPr lang="fr" sz="1011" dirty="0">
                 <a:solidFill>
                   <a:schemeClr val="accent3"/>
                 </a:solidFill>
@@ -13011,10 +13311,10 @@
                 <a:cs typeface="Poppins ExtraBold"/>
                 <a:sym typeface="Poppins ExtraBold"/>
               </a:rPr>
-              <a:t>107</a:t>
+              <a:t>{{FICHES_COUNT}}</a:t>
             </a:r>
             <a:r>
-              <a:rPr lang="fr" sz="1011">
+              <a:rPr lang="fr" sz="1011" dirty="0">
                 <a:solidFill>
                   <a:srgbClr val="48A775"/>
                 </a:solidFill>
@@ -13026,7 +13326,7 @@
               <a:t> </a:t>
             </a:r>
             <a:r>
-              <a:rPr lang="fr" sz="1011">
+              <a:rPr lang="fr" sz="1011" dirty="0">
                 <a:solidFill>
                   <a:schemeClr val="dk1"/>
                 </a:solidFill>
@@ -13038,7 +13338,7 @@
               <a:t>actions </a:t>
             </a:r>
             <a:r>
-              <a:rPr lang="fr" sz="1011">
+              <a:rPr lang="fr" sz="1011" dirty="0">
                 <a:solidFill>
                   <a:schemeClr val="accent3"/>
                 </a:solidFill>
@@ -13047,10 +13347,10 @@
                 <a:cs typeface="Poppins ExtraBold"/>
                 <a:sym typeface="Poppins ExtraBold"/>
               </a:rPr>
-              <a:t>256</a:t>
+              <a:t>{{SOUS_FICHES_COUNT}}</a:t>
             </a:r>
             <a:r>
-              <a:rPr lang="fr" sz="1011">
+              <a:rPr lang="fr" sz="1011" dirty="0">
                 <a:solidFill>
                   <a:srgbClr val="48A775"/>
                 </a:solidFill>
@@ -13062,7 +13362,7 @@
               <a:t> </a:t>
             </a:r>
             <a:r>
-              <a:rPr lang="fr" sz="1011">
+              <a:rPr lang="fr" sz="1011" dirty="0">
                 <a:solidFill>
                   <a:schemeClr val="dk1"/>
                 </a:solidFill>
@@ -13073,7 +13373,7 @@
               </a:rPr>
               <a:t>sous-actions</a:t>
             </a:r>
-            <a:endParaRPr sz="1011">
+            <a:endParaRPr sz="1011" dirty="0">
               <a:solidFill>
                 <a:schemeClr val="dk1"/>
               </a:solidFill>
@@ -13098,7 +13398,7 @@
               <a:buFont typeface="Arial"/>
               <a:buNone/>
             </a:pPr>
-            <a:endParaRPr sz="1214">
+            <a:endParaRPr sz="1214" dirty="0">
               <a:solidFill>
                 <a:srgbClr val="48A775"/>
               </a:solidFill>
@@ -13193,15 +13493,15 @@
       </p:sp>
       <p:pic>
         <p:nvPicPr>
-          <p:cNvPr id="284" name="Google Shape;284;p30" title="app.territoiresentransitions.fr_collectivite_5460_plans_tableau-de-bord.png"/>
+          <p:cNvPr id="284" name="img_axe_count_by_statut_pie"/>
           <p:cNvPicPr preferRelativeResize="0"/>
           <p:nvPr/>
         </p:nvPicPr>
-        <p:blipFill rotWithShape="1">
+        <p:blipFill>
           <a:blip r:embed="rId7">
             <a:alphaModFix/>
           </a:blip>
-          <a:srcRect l="5823" t="7590" r="5814" b="4047"/>
+          <a:srcRect t="224" b="224"/>
           <a:stretch/>
         </p:blipFill>
         <p:spPr>
@@ -13316,7 +13616,7 @@
               <a:buNone/>
             </a:pPr>
             <a:r>
-              <a:rPr lang="fr">
+              <a:rPr lang="fr" dirty="0">
                 <a:solidFill>
                   <a:schemeClr val="dk1"/>
                 </a:solidFill>
@@ -13325,9 +13625,9 @@
                 <a:cs typeface="Poppins SemiBold"/>
                 <a:sym typeface="Poppins SemiBold"/>
               </a:rPr>
-              <a:t>PCAET 2019-2025</a:t>
+              <a:t>{{PLAN_NOM}}</a:t>
             </a:r>
-            <a:endParaRPr>
+            <a:endParaRPr dirty="0">
               <a:solidFill>
                 <a:schemeClr val="dk1"/>
               </a:solidFill>
@@ -13374,7 +13674,7 @@
               <a:buNone/>
             </a:pPr>
             <a:r>
-              <a:rPr lang="fr" sz="900">
+              <a:rPr lang="fr-FR" sz="900" dirty="0">
                 <a:solidFill>
                   <a:srgbClr val="999999"/>
                 </a:solidFill>
@@ -13383,9 +13683,9 @@
                 <a:cs typeface="Poppins Medium"/>
                 <a:sym typeface="Poppins Medium"/>
               </a:rPr>
-              <a:t>Plan Climat Air Énergie Territorial</a:t>
+              <a:t>{{PLAN_TYPE}}</a:t>
             </a:r>
-            <a:endParaRPr sz="900">
+            <a:endParaRPr sz="900" dirty="0">
               <a:solidFill>
                 <a:srgbClr val="999999"/>
               </a:solidFill>
@@ -13399,323 +13699,49 @@
       </p:sp>
       <p:pic>
         <p:nvPicPr>
-          <p:cNvPr id="288" name="Google Shape;288;p30"/>
-          <p:cNvPicPr preferRelativeResize="0"/>
+          <p:cNvPr id="2" name="img_collectivite_logo">
+            <a:extLst>
+              <a:ext uri="{FF2B5EF4-FFF2-40B4-BE49-F238E27FC236}">
+                <a16:creationId xmlns:a16="http://schemas.microsoft.com/office/drawing/2014/main" id="{9C68D36B-005A-DA83-6CED-54CF75F0665D}"/>
+              </a:ext>
+            </a:extLst>
+          </p:cNvPr>
+          <p:cNvPicPr>
+            <a:picLocks noChangeAspect="1" noChangeArrowheads="1"/>
+          </p:cNvPicPr>
           <p:nvPr/>
         </p:nvPicPr>
         <p:blipFill>
           <a:blip r:embed="rId8">
-            <a:alphaModFix/>
+            <a:extLst>
+              <a:ext uri="{28A0092B-C50C-407E-A947-70E740481C1C}">
+                <a14:useLocalDpi xmlns:a14="http://schemas.microsoft.com/office/drawing/2010/main" val="0"/>
+              </a:ext>
+            </a:extLst>
           </a:blip>
+          <a:srcRect/>
           <a:stretch>
             <a:fillRect/>
           </a:stretch>
         </p:blipFill>
-        <p:spPr>
-          <a:xfrm>
-            <a:off x="254236" y="177750"/>
-            <a:ext cx="923528" cy="400200"/>
+        <p:spPr bwMode="auto">
+          <a:xfrm>
+            <a:off x="254236" y="265816"/>
+            <a:ext cx="923528" cy="254669"/>
           </a:xfrm>
           <a:prstGeom prst="rect">
             <a:avLst/>
           </a:prstGeom>
           <a:noFill/>
-          <a:ln w="9525" cap="flat" cmpd="sng">
-            <a:solidFill>
-              <a:schemeClr val="lt2"/>
-            </a:solidFill>
-            <a:prstDash val="solid"/>
-            <a:round/>
-            <a:headEnd type="none" w="sm" len="sm"/>
-            <a:tailEnd type="none" w="sm" len="sm"/>
-          </a:ln>
-        </p:spPr>
-      </p:pic>
-    </p:spTree>
-  </p:cSld>
-  <p:clrMapOvr>
-    <a:masterClrMapping/>
-  </p:clrMapOvr>
-</p:sld>
-</file>
-
-<file path=ppt/slides/slide14.xml><?xml version="1.0" encoding="utf-8"?>
-<p:sld xmlns:a="http://schemas.openxmlformats.org/drawingml/2006/main" xmlns:r="http://schemas.openxmlformats.org/officeDocument/2006/relationships" xmlns:p="http://schemas.openxmlformats.org/presentationml/2006/main">
-  <p:cSld>
-    <p:spTree>
-      <p:nvGrpSpPr>
-        <p:cNvPr id="1" name="Shape 292"/>
-        <p:cNvGrpSpPr/>
-        <p:nvPr/>
-      </p:nvGrpSpPr>
-      <p:grpSpPr>
-        <a:xfrm>
-          <a:off x="0" y="0"/>
-          <a:ext cx="0" cy="0"/>
-          <a:chOff x="0" y="0"/>
-          <a:chExt cx="0" cy="0"/>
-        </a:xfrm>
-      </p:grpSpPr>
-      <p:sp>
-        <p:nvSpPr>
-          <p:cNvPr id="293" name="Google Shape;293;p31"/>
-          <p:cNvSpPr txBox="1">
-            <a:spLocks noGrp="1"/>
-          </p:cNvSpPr>
-          <p:nvPr>
-            <p:ph type="title"/>
-          </p:nvPr>
-        </p:nvSpPr>
-        <p:spPr>
-          <a:xfrm>
-            <a:off x="576300" y="2754350"/>
-            <a:ext cx="7991400" cy="524100"/>
-          </a:xfrm>
-          <a:prstGeom prst="rect">
-            <a:avLst/>
-          </a:prstGeom>
-        </p:spPr>
-        <p:txBody>
-          <a:bodyPr spcFirstLastPara="1" wrap="square" lIns="91425" tIns="91425" rIns="91425" bIns="91425" anchor="t" anchorCtr="0">
-            <a:normAutofit/>
-          </a:bodyPr>
-          <a:lstStyle/>
-          <a:p>
-            <a:pPr marL="0" lvl="0" indent="0" algn="ctr" rtl="0">
-              <a:spcBef>
-                <a:spcPts val="0"/>
-              </a:spcBef>
-              <a:spcAft>
-                <a:spcPts val="0"/>
-              </a:spcAft>
-              <a:buNone/>
-            </a:pPr>
-            <a:r>
-              <a:rPr lang="fr"/>
-              <a:t>Avancement des axes et leur actions</a:t>
-            </a:r>
-            <a:endParaRPr/>
-          </a:p>
-        </p:txBody>
-      </p:sp>
-      <p:sp>
-        <p:nvSpPr>
-          <p:cNvPr id="294" name="Google Shape;294;p31"/>
-          <p:cNvSpPr txBox="1">
-            <a:spLocks noGrp="1"/>
-          </p:cNvSpPr>
-          <p:nvPr>
-            <p:ph type="sldNum" idx="12"/>
-          </p:nvPr>
-        </p:nvSpPr>
-        <p:spPr>
-          <a:xfrm>
-            <a:off x="8567700" y="4820999"/>
-            <a:ext cx="548700" cy="322500"/>
-          </a:xfrm>
-          <a:prstGeom prst="rect">
-            <a:avLst/>
-          </a:prstGeom>
-        </p:spPr>
-        <p:txBody>
-          <a:bodyPr spcFirstLastPara="1" wrap="square" lIns="91425" tIns="91425" rIns="91425" bIns="91425" anchor="ctr" anchorCtr="0">
-            <a:normAutofit lnSpcReduction="10000"/>
-          </a:bodyPr>
-          <a:lstStyle/>
-          <a:p>
-            <a:pPr marL="0" lvl="0" indent="0" algn="r" rtl="0">
-              <a:spcBef>
-                <a:spcPts val="0"/>
-              </a:spcBef>
-              <a:spcAft>
-                <a:spcPts val="0"/>
-              </a:spcAft>
-              <a:buNone/>
-            </a:pPr>
-            <a:fld id="{00000000-1234-1234-1234-123412341234}" type="slidenum">
-              <a:rPr lang="fr"/>
-              <a:t>14</a:t>
-            </a:fld>
-            <a:endParaRPr/>
-          </a:p>
-        </p:txBody>
-      </p:sp>
-      <p:pic>
-        <p:nvPicPr>
-          <p:cNvPr id="295" name="Google Shape;295;p31" title="Trajectoire.png"/>
-          <p:cNvPicPr preferRelativeResize="0"/>
-          <p:nvPr/>
-        </p:nvPicPr>
-        <p:blipFill>
-          <a:blip r:embed="rId3">
-            <a:alphaModFix/>
-          </a:blip>
-          <a:stretch>
-            <a:fillRect/>
-          </a:stretch>
-        </p:blipFill>
-        <p:spPr>
-          <a:xfrm>
-            <a:off x="4095003" y="1641276"/>
-            <a:ext cx="954000" cy="954000"/>
-          </a:xfrm>
-          <a:prstGeom prst="rect">
-            <a:avLst/>
-          </a:prstGeom>
-          <a:noFill/>
-          <a:ln>
-            <a:noFill/>
-          </a:ln>
-        </p:spPr>
-      </p:pic>
-      <p:sp>
-        <p:nvSpPr>
-          <p:cNvPr id="296" name="Google Shape;296;p31"/>
-          <p:cNvSpPr txBox="1"/>
-          <p:nvPr/>
-        </p:nvSpPr>
-        <p:spPr>
-          <a:xfrm>
-            <a:off x="1265200" y="183775"/>
-            <a:ext cx="3932700" cy="215400"/>
-          </a:xfrm>
-          <a:prstGeom prst="rect">
-            <a:avLst/>
-          </a:prstGeom>
-          <a:noFill/>
-          <a:ln>
-            <a:noFill/>
-          </a:ln>
-        </p:spPr>
-        <p:txBody>
-          <a:bodyPr spcFirstLastPara="1" wrap="square" lIns="0" tIns="0" rIns="0" bIns="0" anchor="ctr" anchorCtr="0">
-            <a:spAutoFit/>
-          </a:bodyPr>
-          <a:lstStyle/>
-          <a:p>
-            <a:pPr marL="0" lvl="0" indent="0" algn="l" rtl="0">
-              <a:spcBef>
-                <a:spcPts val="0"/>
-              </a:spcBef>
-              <a:spcAft>
-                <a:spcPts val="0"/>
-              </a:spcAft>
-              <a:buNone/>
-            </a:pPr>
-            <a:r>
-              <a:rPr lang="fr">
-                <a:solidFill>
-                  <a:schemeClr val="dk1"/>
-                </a:solidFill>
-                <a:latin typeface="Poppins SemiBold"/>
-                <a:ea typeface="Poppins SemiBold"/>
-                <a:cs typeface="Poppins SemiBold"/>
-                <a:sym typeface="Poppins SemiBold"/>
-              </a:rPr>
-              <a:t>PCAET 2019-2025</a:t>
-            </a:r>
-            <a:endParaRPr>
-              <a:solidFill>
-                <a:schemeClr val="dk1"/>
-              </a:solidFill>
-              <a:latin typeface="Poppins SemiBold"/>
-              <a:ea typeface="Poppins SemiBold"/>
-              <a:cs typeface="Poppins SemiBold"/>
-              <a:sym typeface="Poppins SemiBold"/>
-            </a:endParaRPr>
-          </a:p>
-        </p:txBody>
-      </p:sp>
-      <p:sp>
-        <p:nvSpPr>
-          <p:cNvPr id="297" name="Google Shape;297;p31"/>
-          <p:cNvSpPr txBox="1"/>
-          <p:nvPr/>
-        </p:nvSpPr>
-        <p:spPr>
-          <a:xfrm>
-            <a:off x="1265200" y="399175"/>
-            <a:ext cx="7115700" cy="138600"/>
-          </a:xfrm>
-          <a:prstGeom prst="rect">
-            <a:avLst/>
-          </a:prstGeom>
-          <a:noFill/>
-          <a:ln>
-            <a:noFill/>
-          </a:ln>
-        </p:spPr>
-        <p:txBody>
-          <a:bodyPr spcFirstLastPara="1" wrap="square" lIns="0" tIns="0" rIns="0" bIns="0" anchor="ctr" anchorCtr="0">
-            <a:noAutofit/>
-          </a:bodyPr>
-          <a:lstStyle/>
-          <a:p>
-            <a:pPr marL="0" lvl="0" indent="0" algn="l" rtl="0">
-              <a:spcBef>
-                <a:spcPts val="0"/>
-              </a:spcBef>
-              <a:spcAft>
-                <a:spcPts val="0"/>
-              </a:spcAft>
-              <a:buNone/>
-            </a:pPr>
-            <a:r>
-              <a:rPr lang="fr" sz="900">
-                <a:solidFill>
-                  <a:srgbClr val="999999"/>
-                </a:solidFill>
-                <a:latin typeface="Poppins Medium"/>
-                <a:ea typeface="Poppins Medium"/>
-                <a:cs typeface="Poppins Medium"/>
-                <a:sym typeface="Poppins Medium"/>
-              </a:rPr>
-              <a:t>Plan Climat Air Énergie Territorial</a:t>
-            </a:r>
-            <a:endParaRPr sz="900">
-              <a:solidFill>
-                <a:srgbClr val="999999"/>
-              </a:solidFill>
-              <a:latin typeface="Poppins Medium"/>
-              <a:ea typeface="Poppins Medium"/>
-              <a:cs typeface="Poppins Medium"/>
-              <a:sym typeface="Poppins Medium"/>
-            </a:endParaRPr>
-          </a:p>
-        </p:txBody>
-      </p:sp>
-      <p:pic>
-        <p:nvPicPr>
-          <p:cNvPr id="298" name="Google Shape;298;p31"/>
-          <p:cNvPicPr preferRelativeResize="0"/>
-          <p:nvPr/>
-        </p:nvPicPr>
-        <p:blipFill>
-          <a:blip r:embed="rId4">
-            <a:alphaModFix/>
-          </a:blip>
-          <a:stretch>
-            <a:fillRect/>
-          </a:stretch>
-        </p:blipFill>
-        <p:spPr>
-          <a:xfrm>
-            <a:off x="254236" y="177750"/>
-            <a:ext cx="923528" cy="400200"/>
-          </a:xfrm>
-          <a:prstGeom prst="rect">
-            <a:avLst/>
-          </a:prstGeom>
-          <a:noFill/>
-          <a:ln w="9525" cap="flat" cmpd="sng">
-            <a:solidFill>
-              <a:schemeClr val="lt2"/>
-            </a:solidFill>
-            <a:prstDash val="solid"/>
-            <a:round/>
-            <a:headEnd type="none" w="sm" len="sm"/>
-            <a:tailEnd type="none" w="sm" len="sm"/>
-          </a:ln>
+          <a:extLst>
+            <a:ext uri="{909E8E84-426E-40DD-AFC4-6F175D3DCCD1}">
+              <a14:hiddenFill xmlns:a14="http://schemas.microsoft.com/office/drawing/2010/main">
+                <a:solidFill>
+                  <a:srgbClr val="FFFFFF"/>
+                </a:solidFill>
+              </a14:hiddenFill>
+            </a:ext>
+          </a:extLst>
         </p:spPr>
       </p:pic>
     </p:spTree>
@@ -15222,7 +15248,7 @@
               <a:buNone/>
             </a:pPr>
             <a:r>
-              <a:rPr lang="fr" sz="1100">
+              <a:rPr lang="fr" sz="1100" dirty="0">
                 <a:solidFill>
                   <a:schemeClr val="dk2"/>
                 </a:solidFill>
@@ -15230,7 +15256,7 @@
               <a:t>Pilote</a:t>
             </a:r>
             <a:r>
-              <a:rPr lang="fr" sz="1100" b="0">
+              <a:rPr lang="fr" sz="1100" b="0" dirty="0">
                 <a:solidFill>
                   <a:schemeClr val="dk2"/>
                 </a:solidFill>
@@ -15238,7 +15264,7 @@
               <a:t> : A. Dusanter | </a:t>
             </a:r>
             <a:r>
-              <a:rPr lang="fr" sz="1100">
+              <a:rPr lang="fr" sz="1100" dirty="0">
                 <a:solidFill>
                   <a:schemeClr val="dk2"/>
                 </a:solidFill>
@@ -15246,14 +15272,14 @@
               <a:t>Période</a:t>
             </a:r>
             <a:r>
-              <a:rPr lang="fr" sz="1100" b="0">
+              <a:rPr lang="fr" sz="1100" b="0" dirty="0">
                 <a:solidFill>
                   <a:schemeClr val="dk2"/>
                 </a:solidFill>
               </a:rPr>
               <a:t> : 30/10/24 -&gt; 31/12/25</a:t>
             </a:r>
-            <a:endParaRPr sz="1300"/>
+            <a:endParaRPr sz="1300" dirty="0"/>
           </a:p>
         </p:txBody>
       </p:sp>
@@ -16777,10 +16803,10 @@
               <a:buNone/>
             </a:pPr>
             <a:r>
-              <a:rPr lang="fr" sz="1600"/>
-              <a:t>4.3 Créer un nouvel espace boisé à Blois</a:t>
+              <a:rPr lang="fr" sz="1600" dirty="0"/>
+              <a:t>{{FICHE_TITRE}}</a:t>
             </a:r>
-            <a:endParaRPr sz="1600"/>
+            <a:endParaRPr sz="1600" dirty="0"/>
           </a:p>
         </p:txBody>
       </p:sp>
@@ -17056,7 +17082,7 @@
                   <a:schemeClr val="dk2"/>
                 </a:solidFill>
               </a:rPr>
-              <a:t> : A. Dusanter | </a:t>
+              <a:t> : {{FICHE_PILOTES}} | </a:t>
             </a:r>
             <a:r>
               <a:rPr lang="fr" sz="1100" dirty="0">
@@ -17072,7 +17098,7 @@
                   <a:schemeClr val="dk2"/>
                 </a:solidFill>
               </a:rPr>
-              <a:t> : 30/10/24 -&gt; 31/12/25</a:t>
+              <a:t> : {{FICHE_PERIODE}}</a:t>
             </a:r>
             <a:endParaRPr sz="1300" dirty="0"/>
           </a:p>
@@ -18951,7 +18977,7 @@
               <a:buNone/>
             </a:pPr>
             <a:r>
-              <a:rPr lang="fr">
+              <a:rPr lang="fr" dirty="0">
                 <a:solidFill>
                   <a:schemeClr val="dk1"/>
                 </a:solidFill>
@@ -18960,9 +18986,9 @@
                 <a:cs typeface="Poppins SemiBold"/>
                 <a:sym typeface="Poppins SemiBold"/>
               </a:rPr>
-              <a:t>PCAET 2019-2025</a:t>
+              <a:t>{{PLAN_NOM}}</a:t>
             </a:r>
-            <a:endParaRPr>
+            <a:endParaRPr dirty="0">
               <a:solidFill>
                 <a:schemeClr val="dk1"/>
               </a:solidFill>
@@ -19009,7 +19035,7 @@
               <a:buNone/>
             </a:pPr>
             <a:r>
-              <a:rPr lang="fr" sz="900">
+              <a:rPr lang="fr" sz="900" dirty="0">
                 <a:solidFill>
                   <a:srgbClr val="999999"/>
                 </a:solidFill>
@@ -19018,9 +19044,9 @@
                 <a:cs typeface="Poppins Medium"/>
                 <a:sym typeface="Poppins Medium"/>
               </a:rPr>
-              <a:t>Plan Climat Air Énergie Territorial</a:t>
+              <a:t>{{PLAN_TYPE}}</a:t>
             </a:r>
-            <a:endParaRPr sz="900">
+            <a:endParaRPr sz="900" dirty="0">
               <a:solidFill>
                 <a:srgbClr val="999999"/>
               </a:solidFill>
@@ -19032,40 +19058,6 @@
           </a:p>
         </p:txBody>
       </p:sp>
-      <p:pic>
-        <p:nvPicPr>
-          <p:cNvPr id="396" name="Google Shape;396;p34"/>
-          <p:cNvPicPr preferRelativeResize="0"/>
-          <p:nvPr/>
-        </p:nvPicPr>
-        <p:blipFill>
-          <a:blip r:embed="rId8">
-            <a:alphaModFix/>
-          </a:blip>
-          <a:stretch>
-            <a:fillRect/>
-          </a:stretch>
-        </p:blipFill>
-        <p:spPr>
-          <a:xfrm>
-            <a:off x="254236" y="177750"/>
-            <a:ext cx="923528" cy="400200"/>
-          </a:xfrm>
-          <a:prstGeom prst="rect">
-            <a:avLst/>
-          </a:prstGeom>
-          <a:noFill/>
-          <a:ln w="9525" cap="flat" cmpd="sng">
-            <a:solidFill>
-              <a:schemeClr val="lt2"/>
-            </a:solidFill>
-            <a:prstDash val="solid"/>
-            <a:round/>
-            <a:headEnd type="none" w="sm" len="sm"/>
-            <a:tailEnd type="none" w="sm" len="sm"/>
-          </a:ln>
-        </p:spPr>
-      </p:pic>
       <p:sp>
         <p:nvSpPr>
           <p:cNvPr id="397" name="Google Shape;397;p34"/>
@@ -19270,6 +19262,53 @@
           </a:p>
         </p:txBody>
       </p:sp>
+      <p:pic>
+        <p:nvPicPr>
+          <p:cNvPr id="2" name="img_collectivite_logo">
+            <a:extLst>
+              <a:ext uri="{FF2B5EF4-FFF2-40B4-BE49-F238E27FC236}">
+                <a16:creationId xmlns:a16="http://schemas.microsoft.com/office/drawing/2014/main" id="{F42BF0C1-B533-7B83-7136-6EA7AA621D03}"/>
+              </a:ext>
+            </a:extLst>
+          </p:cNvPr>
+          <p:cNvPicPr>
+            <a:picLocks noChangeAspect="1" noChangeArrowheads="1"/>
+          </p:cNvPicPr>
+          <p:nvPr/>
+        </p:nvPicPr>
+        <p:blipFill>
+          <a:blip r:embed="rId8">
+            <a:extLst>
+              <a:ext uri="{28A0092B-C50C-407E-A947-70E740481C1C}">
+                <a14:useLocalDpi xmlns:a14="http://schemas.microsoft.com/office/drawing/2010/main" val="0"/>
+              </a:ext>
+            </a:extLst>
+          </a:blip>
+          <a:srcRect/>
+          <a:stretch>
+            <a:fillRect/>
+          </a:stretch>
+        </p:blipFill>
+        <p:spPr bwMode="auto">
+          <a:xfrm>
+            <a:off x="254236" y="265816"/>
+            <a:ext cx="923528" cy="254669"/>
+          </a:xfrm>
+          <a:prstGeom prst="rect">
+            <a:avLst/>
+          </a:prstGeom>
+          <a:noFill/>
+          <a:extLst>
+            <a:ext uri="{909E8E84-426E-40DD-AFC4-6F175D3DCCD1}">
+              <a14:hiddenFill xmlns:a14="http://schemas.microsoft.com/office/drawing/2010/main">
+                <a:solidFill>
+                  <a:srgbClr val="FFFFFF"/>
+                </a:solidFill>
+              </a14:hiddenFill>
+            </a:ext>
+          </a:extLst>
+        </p:spPr>
+      </p:pic>
     </p:spTree>
   </p:cSld>
   <p:clrMapOvr>
@@ -19330,68 +19369,10 @@
               <a:buNone/>
             </a:pPr>
             <a:r>
-              <a:rPr lang="fr" sz="1600"/>
-              <a:t>4.3 Créer un nouvel espace boisé à Blois - </a:t>
+              <a:rPr lang="fr-FR" sz="1600" dirty="0"/>
+              <a:t>{{FICHE_TITRE}}</a:t>
             </a:r>
-            <a:endParaRPr sz="1600"/>
-          </a:p>
-        </p:txBody>
-      </p:sp>
-      <p:sp>
-        <p:nvSpPr>
-          <p:cNvPr id="405" name="Google Shape;405;p35"/>
-          <p:cNvSpPr txBox="1"/>
-          <p:nvPr/>
-        </p:nvSpPr>
-        <p:spPr>
-          <a:xfrm>
-            <a:off x="8201700" y="218475"/>
-            <a:ext cx="648300" cy="338700"/>
-          </a:xfrm>
-          <a:prstGeom prst="rect">
-            <a:avLst/>
-          </a:prstGeom>
-          <a:noFill/>
-          <a:ln>
-            <a:noFill/>
-          </a:ln>
-        </p:spPr>
-        <p:txBody>
-          <a:bodyPr spcFirstLastPara="1" wrap="square" lIns="91425" tIns="91425" rIns="91425" bIns="91425" anchor="t" anchorCtr="0">
-            <a:spAutoFit/>
-          </a:bodyPr>
-          <a:lstStyle/>
-          <a:p>
-            <a:pPr marL="0" lvl="0" indent="0" algn="l" rtl="0">
-              <a:spcBef>
-                <a:spcPts val="0"/>
-              </a:spcBef>
-              <a:spcAft>
-                <a:spcPts val="0"/>
-              </a:spcAft>
-              <a:buNone/>
-            </a:pPr>
-            <a:r>
-              <a:rPr lang="fr" sz="1000">
-                <a:solidFill>
-                  <a:srgbClr val="5D5D79"/>
-                </a:solidFill>
-                <a:latin typeface="Poppins"/>
-                <a:ea typeface="Poppins"/>
-                <a:cs typeface="Poppins"/>
-                <a:sym typeface="Poppins"/>
-              </a:rPr>
-              <a:t>Page 2</a:t>
-            </a:r>
-            <a:endParaRPr sz="1000">
-              <a:solidFill>
-                <a:srgbClr val="5D5D79"/>
-              </a:solidFill>
-              <a:latin typeface="Poppins"/>
-              <a:ea typeface="Poppins"/>
-              <a:cs typeface="Poppins"/>
-              <a:sym typeface="Poppins"/>
-            </a:endParaRPr>
+            <a:endParaRPr sz="1600" dirty="0"/>
           </a:p>
         </p:txBody>
       </p:sp>
@@ -19493,7 +19474,7 @@
       </p:sp>
       <p:pic>
         <p:nvPicPr>
-          <p:cNvPr id="408" name="img_fiche_indicateur1" title="Hectares d’Espaces Boisés Classés.png"/>
+          <p:cNvPr id="408" name="img_fiche_indicateur_chart_1" title="Hectares d’Espaces Boisés Classés.png"/>
           <p:cNvPicPr preferRelativeResize="0"/>
           <p:nvPr/>
         </p:nvPicPr>
@@ -19501,13 +19482,15 @@
           <a:blip r:embed="rId3">
             <a:alphaModFix/>
           </a:blip>
-          <a:srcRect t="4707"/>
-          <a:stretch/>
+          <a:srcRect/>
+          <a:stretch>
+            <a:fillRect/>
+          </a:stretch>
         </p:blipFill>
         <p:spPr>
           <a:xfrm>
-            <a:off x="477688" y="1951375"/>
-            <a:ext cx="3710623" cy="1845599"/>
+            <a:off x="477688" y="1860212"/>
+            <a:ext cx="3710623" cy="1936753"/>
           </a:xfrm>
           <a:prstGeom prst="rect">
             <a:avLst/>
@@ -19680,7 +19663,7 @@
       </p:sp>
       <p:pic>
         <p:nvPicPr>
-          <p:cNvPr id="412" name="img_fiche_indicateur2" title="Nombre d’arbres plantés.png"/>
+          <p:cNvPr id="412" name="img_fiche_indicateur_chart_2" title="Nombre d’arbres plantés.png"/>
           <p:cNvPicPr preferRelativeResize="0"/>
           <p:nvPr/>
         </p:nvPicPr>
@@ -19688,13 +19671,15 @@
           <a:blip r:embed="rId4">
             <a:alphaModFix/>
           </a:blip>
-          <a:srcRect t="4370"/>
-          <a:stretch/>
+          <a:srcRect/>
+          <a:stretch>
+            <a:fillRect/>
+          </a:stretch>
         </p:blipFill>
         <p:spPr>
           <a:xfrm>
-            <a:off x="4947500" y="1948075"/>
-            <a:ext cx="3710602" cy="1852200"/>
+            <a:off x="4947500" y="1863435"/>
+            <a:ext cx="3710602" cy="1936846"/>
           </a:xfrm>
           <a:prstGeom prst="rect">
             <a:avLst/>
@@ -19740,7 +19725,7 @@
               <a:buNone/>
             </a:pPr>
             <a:r>
-              <a:rPr lang="fr">
+              <a:rPr lang="fr-FR" dirty="0">
                 <a:solidFill>
                   <a:schemeClr val="dk1"/>
                 </a:solidFill>
@@ -19749,9 +19734,9 @@
                 <a:cs typeface="Poppins SemiBold"/>
                 <a:sym typeface="Poppins SemiBold"/>
               </a:rPr>
-              <a:t>PCAET 2019-2025</a:t>
+              <a:t>{{PLAN_NOM}}</a:t>
             </a:r>
-            <a:endParaRPr>
+            <a:endParaRPr dirty="0">
               <a:solidFill>
                 <a:schemeClr val="dk1"/>
               </a:solidFill>
@@ -19798,7 +19783,7 @@
               <a:buNone/>
             </a:pPr>
             <a:r>
-              <a:rPr lang="fr" sz="900">
+              <a:rPr lang="fr-FR" sz="900" dirty="0">
                 <a:solidFill>
                   <a:srgbClr val="999999"/>
                 </a:solidFill>
@@ -19807,9 +19792,9 @@
                 <a:cs typeface="Poppins Medium"/>
                 <a:sym typeface="Poppins Medium"/>
               </a:rPr>
-              <a:t>Plan Climat Air Énergie Territorial</a:t>
+              <a:t>{{PLAN_TYPE}}</a:t>
             </a:r>
-            <a:endParaRPr sz="900">
+            <a:endParaRPr sz="900" dirty="0">
               <a:solidFill>
                 <a:srgbClr val="999999"/>
               </a:solidFill>
@@ -19823,36 +19808,49 @@
       </p:sp>
       <p:pic>
         <p:nvPicPr>
-          <p:cNvPr id="415" name="Google Shape;415;p35"/>
-          <p:cNvPicPr preferRelativeResize="0"/>
+          <p:cNvPr id="2" name="img_collectivite_logo">
+            <a:extLst>
+              <a:ext uri="{FF2B5EF4-FFF2-40B4-BE49-F238E27FC236}">
+                <a16:creationId xmlns:a16="http://schemas.microsoft.com/office/drawing/2014/main" id="{9036B6B6-3928-D554-6E9A-223304B9DCB9}"/>
+              </a:ext>
+            </a:extLst>
+          </p:cNvPr>
+          <p:cNvPicPr>
+            <a:picLocks noChangeAspect="1" noChangeArrowheads="1"/>
+          </p:cNvPicPr>
           <p:nvPr/>
         </p:nvPicPr>
         <p:blipFill>
           <a:blip r:embed="rId5">
-            <a:alphaModFix/>
+            <a:extLst>
+              <a:ext uri="{28A0092B-C50C-407E-A947-70E740481C1C}">
+                <a14:useLocalDpi xmlns:a14="http://schemas.microsoft.com/office/drawing/2010/main" val="0"/>
+              </a:ext>
+            </a:extLst>
           </a:blip>
+          <a:srcRect/>
           <a:stretch>
             <a:fillRect/>
           </a:stretch>
         </p:blipFill>
-        <p:spPr>
-          <a:xfrm>
-            <a:off x="254236" y="177750"/>
-            <a:ext cx="923528" cy="400200"/>
+        <p:spPr bwMode="auto">
+          <a:xfrm>
+            <a:off x="254236" y="265816"/>
+            <a:ext cx="923528" cy="254669"/>
           </a:xfrm>
           <a:prstGeom prst="rect">
             <a:avLst/>
           </a:prstGeom>
           <a:noFill/>
-          <a:ln w="9525" cap="flat" cmpd="sng">
-            <a:solidFill>
-              <a:schemeClr val="lt2"/>
-            </a:solidFill>
-            <a:prstDash val="solid"/>
-            <a:round/>
-            <a:headEnd type="none" w="sm" len="sm"/>
-            <a:tailEnd type="none" w="sm" len="sm"/>
-          </a:ln>
+          <a:extLst>
+            <a:ext uri="{909E8E84-426E-40DD-AFC4-6F175D3DCCD1}">
+              <a14:hiddenFill xmlns:a14="http://schemas.microsoft.com/office/drawing/2010/main">
+                <a:solidFill>
+                  <a:srgbClr val="FFFFFF"/>
+                </a:solidFill>
+              </a14:hiddenFill>
+            </a:ext>
+          </a:extLst>
         </p:spPr>
       </p:pic>
     </p:spTree>
@@ -21619,7 +21617,7 @@
                   <a:srgbClr val="404092"/>
                 </a:solidFill>
               </a:rPr>
-              <a:t>Synthèse du plan - page 3</a:t>
+              <a:t>Synthèse du plan</a:t>
             </a:r>
             <a:endParaRPr sz="1100" dirty="0">
               <a:solidFill>
@@ -21650,7 +21648,7 @@
                   <a:srgbClr val="404092"/>
                 </a:solidFill>
               </a:rPr>
-              <a:t>Données territoriales - page 6</a:t>
+              <a:t>Données territoriales</a:t>
             </a:r>
             <a:endParaRPr sz="1100" dirty="0">
               <a:solidFill>
@@ -21681,7 +21679,7 @@
                   <a:srgbClr val="404092"/>
                 </a:solidFill>
               </a:rPr>
-              <a:t>Avancement des axes et leur actions - page 1</a:t>
+              <a:t>Avancement des axes et leur actions</a:t>
             </a:r>
             <a:endParaRPr sz="1100" dirty="0">
               <a:solidFill>
@@ -21698,8 +21696,8 @@
                 <a:srgbClr val="404092"/>
               </a:buClr>
               <a:buSzPts val="1000"/>
-              <a:buFont typeface="Poppins"/>
-              <a:buAutoNum type="arabicPeriod"/>
+              <a:buFont typeface="Arial" panose="020B0604020202020204" pitchFamily="34" charset="0"/>
+              <a:buChar char="•"/>
             </a:pPr>
             <a:r>
               <a:rPr lang="fr-FR" sz="1000" b="0" dirty="0">
@@ -21723,13 +21721,18 @@
               <a:buAutoNum type="alphaUcPeriod" startAt="4"/>
             </a:pPr>
             <a:r>
-              <a:rPr lang="fr-FR" sz="1100" dirty="0">
+              <a:rPr lang="fr-FR" sz="1100">
                 <a:solidFill>
                   <a:srgbClr val="404092"/>
                 </a:solidFill>
               </a:rPr>
-              <a:t>Données territoriales - page 6</a:t>
+              <a:t>Données territoriales</a:t>
             </a:r>
+            <a:endParaRPr lang="fr-FR" sz="1100" dirty="0">
+              <a:solidFill>
+                <a:srgbClr val="404092"/>
+              </a:solidFill>
+            </a:endParaRPr>
           </a:p>
         </p:txBody>
       </p:sp>

</xml_diff>

<commit_message>
feat: add modal to generate report
</commit_message>
<xml_diff>
--- a/apps/backend/src/plans/plans/generate-reports/docs/template_bilan.pptx
+++ b/apps/backend/src/plans/plans/generate-reports/docs/template_bilan.pptx
@@ -17507,124 +17507,155 @@
           </a:p>
         </p:txBody>
       </p:sp>
-      <p:sp>
-        <p:nvSpPr>
-          <p:cNvPr id="372" name="Google Shape;372;p34"/>
-          <p:cNvSpPr/>
+      <p:grpSp>
+        <p:nvGrpSpPr>
+          <p:cNvPr id="3" name="group_fiche_indicateur_1">
+            <a:extLst>
+              <a:ext uri="{FF2B5EF4-FFF2-40B4-BE49-F238E27FC236}">
+                <a16:creationId xmlns:a16="http://schemas.microsoft.com/office/drawing/2014/main" id="{CA172B52-9034-88B6-362F-FEB0BDA47393}"/>
+              </a:ext>
+            </a:extLst>
+          </p:cNvPr>
+          <p:cNvGrpSpPr/>
           <p:nvPr/>
-        </p:nvSpPr>
-        <p:spPr>
+        </p:nvGrpSpPr>
+        <p:grpSpPr>
           <a:xfrm>
             <a:off x="336175" y="4009625"/>
             <a:ext cx="2712900" cy="799200"/>
-          </a:xfrm>
-          <a:prstGeom prst="roundRect">
-            <a:avLst>
-              <a:gd name="adj" fmla="val 6187"/>
-            </a:avLst>
-          </a:prstGeom>
-          <a:solidFill>
-            <a:srgbClr val="FBFCFE"/>
-          </a:solidFill>
-          <a:ln w="10975" cap="flat" cmpd="sng">
+            <a:chOff x="336175" y="4009625"/>
+            <a:chExt cx="2712900" cy="799200"/>
+          </a:xfrm>
+        </p:grpSpPr>
+        <p:sp>
+          <p:nvSpPr>
+            <p:cNvPr id="372" name="Google Shape;372;p34"/>
+            <p:cNvSpPr/>
+            <p:nvPr/>
+          </p:nvSpPr>
+          <p:spPr>
+            <a:xfrm>
+              <a:off x="336175" y="4009625"/>
+              <a:ext cx="2712900" cy="799200"/>
+            </a:xfrm>
+            <a:prstGeom prst="roundRect">
+              <a:avLst>
+                <a:gd name="adj" fmla="val 6187"/>
+              </a:avLst>
+            </a:prstGeom>
             <a:solidFill>
-              <a:srgbClr val="EEEEEE"/>
+              <a:srgbClr val="FBFCFE"/>
             </a:solidFill>
-            <a:prstDash val="solid"/>
-            <a:round/>
-            <a:headEnd type="none" w="sm" len="sm"/>
-            <a:tailEnd type="none" w="sm" len="sm"/>
-          </a:ln>
-        </p:spPr>
-        <p:txBody>
-          <a:bodyPr spcFirstLastPara="1" wrap="square" lIns="105525" tIns="105525" rIns="105525" bIns="105525" anchor="ctr" anchorCtr="0">
-            <a:noAutofit/>
-          </a:bodyPr>
-          <a:lstStyle/>
-          <a:p>
-            <a:pPr marL="0" lvl="0" indent="0" algn="ctr" rtl="0">
-              <a:spcBef>
-                <a:spcPts val="0"/>
-              </a:spcBef>
-              <a:spcAft>
-                <a:spcPts val="0"/>
-              </a:spcAft>
-              <a:buNone/>
-            </a:pPr>
-            <a:endParaRPr sz="1615">
-              <a:latin typeface="Poppins"/>
-              <a:ea typeface="Poppins"/>
-              <a:cs typeface="Poppins"/>
-              <a:sym typeface="Poppins"/>
-            </a:endParaRPr>
-          </a:p>
-        </p:txBody>
-      </p:sp>
-      <p:sp>
-        <p:nvSpPr>
-          <p:cNvPr id="373" name="Google Shape;373;p34"/>
-          <p:cNvSpPr txBox="1"/>
-          <p:nvPr/>
-        </p:nvSpPr>
-        <p:spPr>
-          <a:xfrm>
-            <a:off x="1124933" y="4251422"/>
-            <a:ext cx="1573500" cy="337500"/>
-          </a:xfrm>
-          <a:prstGeom prst="rect">
-            <a:avLst/>
-          </a:prstGeom>
-          <a:noFill/>
-          <a:ln>
-            <a:noFill/>
-          </a:ln>
-        </p:spPr>
-        <p:txBody>
-          <a:bodyPr spcFirstLastPara="1" wrap="square" lIns="0" tIns="0" rIns="0" bIns="0" anchor="t" anchorCtr="0">
-            <a:spAutoFit/>
-          </a:bodyPr>
-          <a:lstStyle/>
-          <a:p>
-            <a:pPr marL="0" lvl="0" indent="0" algn="l" rtl="0">
-              <a:spcBef>
-                <a:spcPts val="0"/>
-              </a:spcBef>
-              <a:spcAft>
-                <a:spcPts val="0"/>
-              </a:spcAft>
-              <a:buClr>
-                <a:schemeClr val="dk1"/>
-              </a:buClr>
-              <a:buSzPts val="1270"/>
-              <a:buFont typeface="Arial"/>
-              <a:buNone/>
-            </a:pPr>
-            <a:r>
-              <a:rPr lang="fr" sz="1038" b="1">
-                <a:solidFill>
-                  <a:schemeClr val="dk1"/>
-                </a:solidFill>
+            <a:ln w="10975" cap="flat" cmpd="sng">
+              <a:solidFill>
+                <a:srgbClr val="EEEEEE"/>
+              </a:solidFill>
+              <a:prstDash val="solid"/>
+              <a:round/>
+              <a:headEnd type="none" w="sm" len="sm"/>
+              <a:tailEnd type="none" w="sm" len="sm"/>
+            </a:ln>
+          </p:spPr>
+          <p:txBody>
+            <a:bodyPr spcFirstLastPara="1" wrap="square" lIns="105525" tIns="105525" rIns="105525" bIns="105525" anchor="ctr" anchorCtr="0">
+              <a:noAutofit/>
+            </a:bodyPr>
+            <a:lstStyle/>
+            <a:p>
+              <a:pPr marL="0" lvl="0" indent="0" algn="ctr" rtl="0">
+                <a:spcBef>
+                  <a:spcPts val="0"/>
+                </a:spcBef>
+                <a:spcAft>
+                  <a:spcPts val="0"/>
+                </a:spcAft>
+                <a:buNone/>
+              </a:pPr>
+              <a:endParaRPr sz="1615">
                 <a:latin typeface="Poppins"/>
                 <a:ea typeface="Poppins"/>
                 <a:cs typeface="Poppins"/>
                 <a:sym typeface="Poppins"/>
-              </a:rPr>
-              <a:t>Nombre d’arbres plantés  </a:t>
-            </a:r>
-            <a:r>
-              <a:rPr lang="fr" sz="1154">
-                <a:solidFill>
-                  <a:schemeClr val="accent3"/>
-                </a:solidFill>
-                <a:latin typeface="Poppins ExtraBold"/>
-                <a:ea typeface="Poppins ExtraBold"/>
-                <a:cs typeface="Poppins ExtraBold"/>
-                <a:sym typeface="Poppins ExtraBold"/>
-              </a:rPr>
-              <a:t>23 </a:t>
-            </a:r>
-            <a:r>
-              <a:rPr lang="fr" sz="1154">
+              </a:endParaRPr>
+            </a:p>
+          </p:txBody>
+        </p:sp>
+        <p:sp>
+          <p:nvSpPr>
+            <p:cNvPr id="373" name="Google Shape;373;p34"/>
+            <p:cNvSpPr txBox="1"/>
+            <p:nvPr/>
+          </p:nvSpPr>
+          <p:spPr>
+            <a:xfrm>
+              <a:off x="1124933" y="4251422"/>
+              <a:ext cx="1573500" cy="337500"/>
+            </a:xfrm>
+            <a:prstGeom prst="rect">
+              <a:avLst/>
+            </a:prstGeom>
+            <a:noFill/>
+            <a:ln>
+              <a:noFill/>
+            </a:ln>
+          </p:spPr>
+          <p:txBody>
+            <a:bodyPr spcFirstLastPara="1" wrap="square" lIns="0" tIns="0" rIns="0" bIns="0" anchor="t" anchorCtr="0">
+              <a:spAutoFit/>
+            </a:bodyPr>
+            <a:lstStyle/>
+            <a:p>
+              <a:pPr marL="0" lvl="0" indent="0" algn="l" rtl="0">
+                <a:spcBef>
+                  <a:spcPts val="0"/>
+                </a:spcBef>
+                <a:spcAft>
+                  <a:spcPts val="0"/>
+                </a:spcAft>
+                <a:buClr>
+                  <a:schemeClr val="dk1"/>
+                </a:buClr>
+                <a:buSzPts val="1270"/>
+                <a:buFont typeface="Arial"/>
+                <a:buNone/>
+              </a:pPr>
+              <a:r>
+                <a:rPr lang="fr" sz="1038" b="1" dirty="0">
+                  <a:solidFill>
+                    <a:schemeClr val="dk1"/>
+                  </a:solidFill>
+                  <a:latin typeface="Poppins"/>
+                  <a:ea typeface="Poppins"/>
+                  <a:cs typeface="Poppins"/>
+                  <a:sym typeface="Poppins"/>
+                </a:rPr>
+                <a:t>Nombre d’arbres plantés  </a:t>
+              </a:r>
+              <a:r>
+                <a:rPr lang="fr" sz="1154" dirty="0">
+                  <a:solidFill>
+                    <a:schemeClr val="accent3"/>
+                  </a:solidFill>
+                  <a:latin typeface="Poppins ExtraBold"/>
+                  <a:ea typeface="Poppins ExtraBold"/>
+                  <a:cs typeface="Poppins ExtraBold"/>
+                  <a:sym typeface="Poppins ExtraBold"/>
+                </a:rPr>
+                <a:t>23 </a:t>
+              </a:r>
+              <a:r>
+                <a:rPr lang="fr" sz="1154" dirty="0">
+                  <a:solidFill>
+                    <a:schemeClr val="accent2"/>
+                  </a:solidFill>
+                  <a:latin typeface="Poppins Medium"/>
+                  <a:ea typeface="Poppins Medium"/>
+                  <a:cs typeface="Poppins Medium"/>
+                  <a:sym typeface="Poppins Medium"/>
+                </a:rPr>
+                <a:t>(2024)</a:t>
+              </a:r>
+              <a:endParaRPr sz="1154" dirty="0">
                 <a:solidFill>
                   <a:schemeClr val="accent2"/>
                 </a:solidFill>
@@ -17632,49 +17663,39 @@
                 <a:ea typeface="Poppins Medium"/>
                 <a:cs typeface="Poppins Medium"/>
                 <a:sym typeface="Poppins Medium"/>
-              </a:rPr>
-              <a:t>(2024)</a:t>
-            </a:r>
-            <a:endParaRPr sz="1154">
-              <a:solidFill>
-                <a:schemeClr val="accent2"/>
-              </a:solidFill>
-              <a:latin typeface="Poppins Medium"/>
-              <a:ea typeface="Poppins Medium"/>
-              <a:cs typeface="Poppins Medium"/>
-              <a:sym typeface="Poppins Medium"/>
-            </a:endParaRPr>
-          </a:p>
-        </p:txBody>
-      </p:sp>
-      <p:pic>
-        <p:nvPicPr>
-          <p:cNvPr id="374" name="Google Shape;374;p34" title="tree.png"/>
-          <p:cNvPicPr preferRelativeResize="0"/>
-          <p:nvPr/>
-        </p:nvPicPr>
-        <p:blipFill>
-          <a:blip r:embed="rId5">
-            <a:alphaModFix/>
-          </a:blip>
-          <a:stretch>
-            <a:fillRect/>
-          </a:stretch>
-        </p:blipFill>
-        <p:spPr>
-          <a:xfrm>
-            <a:off x="478727" y="4145200"/>
-            <a:ext cx="528223" cy="528203"/>
-          </a:xfrm>
-          <a:prstGeom prst="rect">
-            <a:avLst/>
-          </a:prstGeom>
-          <a:noFill/>
-          <a:ln>
+              </a:endParaRPr>
+            </a:p>
+          </p:txBody>
+        </p:sp>
+        <p:pic>
+          <p:nvPicPr>
+            <p:cNvPr id="374" name="Google Shape;374;p34" title="tree.png"/>
+            <p:cNvPicPr preferRelativeResize="0"/>
+            <p:nvPr/>
+          </p:nvPicPr>
+          <p:blipFill>
+            <a:blip r:embed="rId5">
+              <a:alphaModFix/>
+            </a:blip>
+            <a:stretch>
+              <a:fillRect/>
+            </a:stretch>
+          </p:blipFill>
+          <p:spPr>
+            <a:xfrm>
+              <a:off x="478727" y="4145200"/>
+              <a:ext cx="528223" cy="528203"/>
+            </a:xfrm>
+            <a:prstGeom prst="rect">
+              <a:avLst/>
+            </a:prstGeom>
             <a:noFill/>
-          </a:ln>
-        </p:spPr>
-      </p:pic>
+            <a:ln>
+              <a:noFill/>
+            </a:ln>
+          </p:spPr>
+        </p:pic>
+      </p:grpSp>
       <p:cxnSp>
         <p:nvCxnSpPr>
           <p:cNvPr id="375" name="Google Shape;375;p34"/>

</xml_diff>